<commit_message>
Updated legend and links to Excel data
</commit_message>
<xml_diff>
--- a/fig-5.pptx
+++ b/fig-5.pptx
@@ -837,7 +837,7 @@
                 <a:cs typeface="+mn-cs"/>
               </a:defRPr>
             </a:pPr>
-            <a:endParaRPr lang="LID4096"/>
+            <a:endParaRPr lang="en-DE"/>
           </a:p>
         </c:txPr>
         <c:crossAx val="1394374607"/>
@@ -896,7 +896,7 @@
           <a:lstStyle/>
           <a:p>
             <a:pPr>
-              <a:defRPr sz="1000" b="0" i="0" u="none" strike="noStrike" kern="1200" baseline="0">
+              <a:defRPr sz="900" b="0" i="0" u="none" strike="noStrike" kern="1200" baseline="0">
                 <a:solidFill>
                   <a:schemeClr val="tx1">
                     <a:lumMod val="65000"/>
@@ -908,7 +908,7 @@
                 <a:cs typeface="+mn-cs"/>
               </a:defRPr>
             </a:pPr>
-            <a:endParaRPr lang="LID4096"/>
+            <a:endParaRPr lang="en-DE"/>
           </a:p>
         </c:txPr>
         <c:crossAx val="1393752463"/>
@@ -948,7 +948,7 @@
       <a:pPr>
         <a:defRPr/>
       </a:pPr>
-      <a:endParaRPr lang="LID4096"/>
+      <a:endParaRPr lang="en-DE"/>
     </a:p>
   </c:txPr>
   <c:externalData r:id="rId3">
@@ -1367,7 +1367,7 @@
                 <a:cs typeface="+mn-cs"/>
               </a:defRPr>
             </a:pPr>
-            <a:endParaRPr lang="LID4096"/>
+            <a:endParaRPr lang="en-DE"/>
           </a:p>
         </c:txPr>
         <c:crossAx val="1394333007"/>
@@ -1426,7 +1426,7 @@
           <a:lstStyle/>
           <a:p>
             <a:pPr>
-              <a:defRPr sz="1000" b="0" i="0" u="none" strike="noStrike" kern="1200" baseline="0">
+              <a:defRPr sz="900" b="0" i="0" u="none" strike="noStrike" kern="1200" baseline="0">
                 <a:solidFill>
                   <a:schemeClr val="tx1">
                     <a:lumMod val="65000"/>
@@ -1438,7 +1438,7 @@
                 <a:cs typeface="+mn-cs"/>
               </a:defRPr>
             </a:pPr>
-            <a:endParaRPr lang="LID4096"/>
+            <a:endParaRPr lang="en-DE"/>
           </a:p>
         </c:txPr>
         <c:crossAx val="1399375743"/>
@@ -1478,7 +1478,7 @@
       <a:pPr>
         <a:defRPr/>
       </a:pPr>
-      <a:endParaRPr lang="LID4096"/>
+      <a:endParaRPr lang="en-DE"/>
     </a:p>
   </c:txPr>
   <c:externalData r:id="rId3">
@@ -2203,7 +2203,7 @@
                 <a:cs typeface="+mn-cs"/>
               </a:defRPr>
             </a:pPr>
-            <a:endParaRPr lang="LID4096"/>
+            <a:endParaRPr lang="en-DE"/>
           </a:p>
         </c:txPr>
         <c:crossAx val="357491728"/>
@@ -2254,7 +2254,7 @@
           <a:lstStyle/>
           <a:p>
             <a:pPr>
-              <a:defRPr sz="1000" b="0" i="0" u="none" strike="noStrike" kern="1200" baseline="0">
+              <a:defRPr sz="900" b="0" i="0" u="none" strike="noStrike" kern="1200" baseline="0">
                 <a:solidFill>
                   <a:schemeClr val="tx1">
                     <a:lumMod val="65000"/>
@@ -2266,7 +2266,7 @@
                 <a:cs typeface="+mn-cs"/>
               </a:defRPr>
             </a:pPr>
-            <a:endParaRPr lang="LID4096"/>
+            <a:endParaRPr lang="en-DE"/>
           </a:p>
         </c:txPr>
         <c:crossAx val="357491336"/>
@@ -2306,7 +2306,7 @@
       <a:pPr>
         <a:defRPr/>
       </a:pPr>
-      <a:endParaRPr lang="LID4096"/>
+      <a:endParaRPr lang="en-DE"/>
     </a:p>
   </c:txPr>
   <c:externalData r:id="rId3">
@@ -2715,7 +2715,7 @@
                 <a:cs typeface="+mn-cs"/>
               </a:defRPr>
             </a:pPr>
-            <a:endParaRPr lang="LID4096"/>
+            <a:endParaRPr lang="en-DE"/>
           </a:p>
         </c:txPr>
         <c:crossAx val="360758040"/>
@@ -2766,7 +2766,7 @@
           <a:lstStyle/>
           <a:p>
             <a:pPr>
-              <a:defRPr sz="1000" b="0" i="0" u="none" strike="noStrike" kern="1200" baseline="0">
+              <a:defRPr sz="900" b="0" i="0" u="none" strike="noStrike" kern="1200" baseline="0">
                 <a:solidFill>
                   <a:schemeClr val="tx1">
                     <a:lumMod val="65000"/>
@@ -2778,7 +2778,7 @@
                 <a:cs typeface="+mn-cs"/>
               </a:defRPr>
             </a:pPr>
-            <a:endParaRPr lang="LID4096"/>
+            <a:endParaRPr lang="en-DE"/>
           </a:p>
         </c:txPr>
         <c:crossAx val="360763920"/>
@@ -2818,7 +2818,7 @@
       <a:pPr>
         <a:defRPr/>
       </a:pPr>
-      <a:endParaRPr lang="LID4096"/>
+      <a:endParaRPr lang="en-DE"/>
     </a:p>
   </c:txPr>
   <c:externalData r:id="rId3">
@@ -3543,7 +3543,7 @@
                 <a:cs typeface="+mn-cs"/>
               </a:defRPr>
             </a:pPr>
-            <a:endParaRPr lang="LID4096"/>
+            <a:endParaRPr lang="en-DE"/>
           </a:p>
         </c:txPr>
         <c:crossAx val="487090384"/>
@@ -3593,7 +3593,7 @@
           <a:lstStyle/>
           <a:p>
             <a:pPr>
-              <a:defRPr sz="1000" b="0" i="0" u="none" strike="noStrike" kern="1200" baseline="0">
+              <a:defRPr sz="900" b="0" i="0" u="none" strike="noStrike" kern="1200" baseline="0">
                 <a:solidFill>
                   <a:schemeClr val="tx1">
                     <a:lumMod val="65000"/>
@@ -3605,7 +3605,7 @@
                 <a:cs typeface="+mn-cs"/>
               </a:defRPr>
             </a:pPr>
-            <a:endParaRPr lang="LID4096"/>
+            <a:endParaRPr lang="en-DE"/>
           </a:p>
         </c:txPr>
         <c:crossAx val="494724272"/>
@@ -3645,7 +3645,7 @@
       <a:pPr>
         <a:defRPr/>
       </a:pPr>
-      <a:endParaRPr lang="LID4096"/>
+      <a:endParaRPr lang="en-DE"/>
     </a:p>
   </c:txPr>
   <c:externalData r:id="rId3">
@@ -3954,25 +3954,25 @@
                 <c:formatCode>0.00%</c:formatCode>
                 <c:ptCount val="7"/>
                 <c:pt idx="0">
-                  <c:v>0.21820000000000001</c:v>
+                  <c:v>0.1696</c:v>
                 </c:pt>
                 <c:pt idx="1">
-                  <c:v>0.19769999999999999</c:v>
+                  <c:v>0.1231</c:v>
                 </c:pt>
                 <c:pt idx="2">
-                  <c:v>0.1923</c:v>
+                  <c:v>0.11849999999999999</c:v>
                 </c:pt>
                 <c:pt idx="3">
-                  <c:v>0.19040000000000001</c:v>
+                  <c:v>0.10290000000000001</c:v>
                 </c:pt>
                 <c:pt idx="4">
-                  <c:v>0.18790000000000001</c:v>
+                  <c:v>0.1004</c:v>
                 </c:pt>
                 <c:pt idx="5">
-                  <c:v>0.18790000000000001</c:v>
+                  <c:v>0.1011</c:v>
                 </c:pt>
                 <c:pt idx="6">
-                  <c:v>0.18740000000000001</c:v>
+                  <c:v>9.9699999999999997E-2</c:v>
                 </c:pt>
               </c:numCache>
             </c:numRef>
@@ -4052,7 +4052,7 @@
                 <a:cs typeface="+mn-cs"/>
               </a:defRPr>
             </a:pPr>
-            <a:endParaRPr lang="LID4096"/>
+            <a:endParaRPr lang="en-DE"/>
           </a:p>
         </c:txPr>
         <c:crossAx val="382375680"/>
@@ -4102,7 +4102,7 @@
           <a:lstStyle/>
           <a:p>
             <a:pPr>
-              <a:defRPr sz="1000" b="0" i="0" u="none" strike="noStrike" kern="1200" baseline="0">
+              <a:defRPr sz="900" b="0" i="0" u="none" strike="noStrike" kern="1200" baseline="0">
                 <a:solidFill>
                   <a:schemeClr val="tx1">
                     <a:lumMod val="65000"/>
@@ -4114,7 +4114,7 @@
                 <a:cs typeface="+mn-cs"/>
               </a:defRPr>
             </a:pPr>
-            <a:endParaRPr lang="LID4096"/>
+            <a:endParaRPr lang="en-DE"/>
           </a:p>
         </c:txPr>
         <c:crossAx val="491129232"/>
@@ -4154,11 +4154,11 @@
       <a:pPr>
         <a:defRPr/>
       </a:pPr>
-      <a:endParaRPr lang="LID4096"/>
+      <a:endParaRPr lang="en-DE"/>
     </a:p>
   </c:txPr>
   <c:externalData r:id="rId3">
-    <c:autoUpdate val="0"/>
+    <c:autoUpdate val="1"/>
   </c:externalData>
 </c:chartSpace>
 </file>
@@ -7648,7 +7648,7 @@
           <a:p>
             <a:fld id="{77D2DEC9-DE1E-4A29-BD75-5B9E9CCA79FB}" type="datetimeFigureOut">
               <a:rPr lang="LID4096" smtClean="0"/>
-              <a:t>07/14/2021</a:t>
+              <a:t>08/03/2021</a:t>
             </a:fld>
             <a:endParaRPr lang="LID4096"/>
           </a:p>
@@ -7848,7 +7848,7 @@
           <a:p>
             <a:fld id="{77D2DEC9-DE1E-4A29-BD75-5B9E9CCA79FB}" type="datetimeFigureOut">
               <a:rPr lang="LID4096" smtClean="0"/>
-              <a:t>07/14/2021</a:t>
+              <a:t>08/03/2021</a:t>
             </a:fld>
             <a:endParaRPr lang="LID4096"/>
           </a:p>
@@ -8058,7 +8058,7 @@
           <a:p>
             <a:fld id="{77D2DEC9-DE1E-4A29-BD75-5B9E9CCA79FB}" type="datetimeFigureOut">
               <a:rPr lang="LID4096" smtClean="0"/>
-              <a:t>07/14/2021</a:t>
+              <a:t>08/03/2021</a:t>
             </a:fld>
             <a:endParaRPr lang="LID4096"/>
           </a:p>
@@ -8258,7 +8258,7 @@
           <a:p>
             <a:fld id="{77D2DEC9-DE1E-4A29-BD75-5B9E9CCA79FB}" type="datetimeFigureOut">
               <a:rPr lang="LID4096" smtClean="0"/>
-              <a:t>07/14/2021</a:t>
+              <a:t>08/03/2021</a:t>
             </a:fld>
             <a:endParaRPr lang="LID4096"/>
           </a:p>
@@ -8534,7 +8534,7 @@
           <a:p>
             <a:fld id="{77D2DEC9-DE1E-4A29-BD75-5B9E9CCA79FB}" type="datetimeFigureOut">
               <a:rPr lang="LID4096" smtClean="0"/>
-              <a:t>07/14/2021</a:t>
+              <a:t>08/03/2021</a:t>
             </a:fld>
             <a:endParaRPr lang="LID4096"/>
           </a:p>
@@ -8802,7 +8802,7 @@
           <a:p>
             <a:fld id="{77D2DEC9-DE1E-4A29-BD75-5B9E9CCA79FB}" type="datetimeFigureOut">
               <a:rPr lang="LID4096" smtClean="0"/>
-              <a:t>07/14/2021</a:t>
+              <a:t>08/03/2021</a:t>
             </a:fld>
             <a:endParaRPr lang="LID4096"/>
           </a:p>
@@ -9217,7 +9217,7 @@
           <a:p>
             <a:fld id="{77D2DEC9-DE1E-4A29-BD75-5B9E9CCA79FB}" type="datetimeFigureOut">
               <a:rPr lang="LID4096" smtClean="0"/>
-              <a:t>07/14/2021</a:t>
+              <a:t>08/03/2021</a:t>
             </a:fld>
             <a:endParaRPr lang="LID4096"/>
           </a:p>
@@ -9359,7 +9359,7 @@
           <a:p>
             <a:fld id="{77D2DEC9-DE1E-4A29-BD75-5B9E9CCA79FB}" type="datetimeFigureOut">
               <a:rPr lang="LID4096" smtClean="0"/>
-              <a:t>07/14/2021</a:t>
+              <a:t>08/03/2021</a:t>
             </a:fld>
             <a:endParaRPr lang="LID4096"/>
           </a:p>
@@ -9472,7 +9472,7 @@
           <a:p>
             <a:fld id="{77D2DEC9-DE1E-4A29-BD75-5B9E9CCA79FB}" type="datetimeFigureOut">
               <a:rPr lang="LID4096" smtClean="0"/>
-              <a:t>07/14/2021</a:t>
+              <a:t>08/03/2021</a:t>
             </a:fld>
             <a:endParaRPr lang="LID4096"/>
           </a:p>
@@ -9785,7 +9785,7 @@
           <a:p>
             <a:fld id="{77D2DEC9-DE1E-4A29-BD75-5B9E9CCA79FB}" type="datetimeFigureOut">
               <a:rPr lang="LID4096" smtClean="0"/>
-              <a:t>07/14/2021</a:t>
+              <a:t>08/03/2021</a:t>
             </a:fld>
             <a:endParaRPr lang="LID4096"/>
           </a:p>
@@ -10074,7 +10074,7 @@
           <a:p>
             <a:fld id="{77D2DEC9-DE1E-4A29-BD75-5B9E9CCA79FB}" type="datetimeFigureOut">
               <a:rPr lang="LID4096" smtClean="0"/>
-              <a:t>07/14/2021</a:t>
+              <a:t>08/03/2021</a:t>
             </a:fld>
             <a:endParaRPr lang="LID4096"/>
           </a:p>
@@ -10317,7 +10317,7 @@
           <a:p>
             <a:fld id="{77D2DEC9-DE1E-4A29-BD75-5B9E9CCA79FB}" type="datetimeFigureOut">
               <a:rPr lang="LID4096" smtClean="0"/>
-              <a:t>07/14/2021</a:t>
+              <a:t>08/03/2021</a:t>
             </a:fld>
             <a:endParaRPr lang="LID4096"/>
           </a:p>
@@ -10749,14 +10749,14 @@
           <p:nvPr>
             <p:extLst>
               <p:ext uri="{D42A27DB-BD31-4B8C-83A1-F6EECF244321}">
-                <p14:modId xmlns:p14="http://schemas.microsoft.com/office/powerpoint/2010/main" val="3413452719"/>
+                <p14:modId xmlns:p14="http://schemas.microsoft.com/office/powerpoint/2010/main" val="2508246276"/>
               </p:ext>
             </p:extLst>
           </p:nvPr>
         </p:nvGraphicFramePr>
         <p:xfrm>
           <a:off x="97653" y="177552"/>
-          <a:ext cx="11984856" cy="6533965"/>
+          <a:ext cx="11984856" cy="6605487"/>
         </p:xfrm>
         <a:graphic>
           <a:graphicData uri="http://schemas.openxmlformats.org/drawingml/2006/table">
@@ -10809,10 +10809,137 @@
                     <a:p>
                       <a:pPr algn="l"/>
                       <a:r>
-                        <a:rPr lang="en-US" dirty="0"/>
+                        <a:rPr lang="en-US" sz="1800" i="1" dirty="0"/>
                         <a:t>MW</a:t>
                       </a:r>
-                      <a:endParaRPr lang="LID4096" dirty="0"/>
+                      <a:r>
+                        <a:rPr lang="en-US" sz="1400" dirty="0"/>
+                        <a:t>  </a:t>
+                      </a:r>
+                      <a:r>
+                        <a:rPr lang="en-US" sz="1400" i="0" strike="sngStrike" baseline="0" dirty="0">
+                          <a:solidFill>
+                            <a:srgbClr val="5B9BD5"/>
+                          </a:solidFill>
+                        </a:rPr>
+                        <a:t> ● </a:t>
+                      </a:r>
+                      <a:r>
+                        <a:rPr lang="en-US" sz="1400" i="0" strike="noStrike" baseline="0" dirty="0">
+                          <a:solidFill>
+                            <a:srgbClr val="5B9BD5"/>
+                          </a:solidFill>
+                        </a:rPr>
+                        <a:t> DATVC                </a:t>
+                      </a:r>
+                      <a:r>
+                        <a:rPr lang="en-US" sz="1400" i="0" strike="noStrike" baseline="0" dirty="0"/>
+                        <a:t> </a:t>
+                      </a:r>
+                      <a:r>
+                        <a:rPr lang="en-US" sz="1400" i="0" strike="sngStrike" baseline="0" dirty="0">
+                          <a:solidFill>
+                            <a:srgbClr val="70AD47"/>
+                          </a:solidFill>
+                        </a:rPr>
+                        <a:t> ● </a:t>
+                      </a:r>
+                      <a:r>
+                        <a:rPr lang="en-US" sz="1400" i="0" strike="noStrike" baseline="0" dirty="0">
+                          <a:solidFill>
+                            <a:srgbClr val="70AD47"/>
+                          </a:solidFill>
+                        </a:rPr>
+                        <a:t> </a:t>
+                      </a:r>
+                      <a:r>
+                        <a:rPr lang="en-US" sz="1400" i="0" strike="noStrike" baseline="0" dirty="0" err="1">
+                          <a:solidFill>
+                            <a:srgbClr val="70AD47"/>
+                          </a:solidFill>
+                        </a:rPr>
+                        <a:t>Porod</a:t>
+                      </a:r>
+                      <a:r>
+                        <a:rPr lang="en-US" sz="1400" i="0" strike="noStrike" baseline="0" dirty="0"/>
+                        <a:t>         </a:t>
+                      </a:r>
+                      <a:r>
+                        <a:rPr lang="en-US" sz="1400" i="0" strike="sngStrike" baseline="0" dirty="0">
+                          <a:solidFill>
+                            <a:srgbClr val="4472C4"/>
+                          </a:solidFill>
+                        </a:rPr>
+                        <a:t> ● </a:t>
+                      </a:r>
+                      <a:r>
+                        <a:rPr lang="en-US" sz="1400" i="0" strike="noStrike" baseline="0" dirty="0">
+                          <a:solidFill>
+                            <a:srgbClr val="4472C4"/>
+                          </a:solidFill>
+                        </a:rPr>
+                        <a:t> DATCLASS</a:t>
+                      </a:r>
+                    </a:p>
+                    <a:p>
+                      <a:pPr lvl="1" algn="l"/>
+                      <a:r>
+                        <a:rPr lang="en-US" sz="1400" i="0" strike="sngStrike" baseline="0" dirty="0">
+                          <a:solidFill>
+                            <a:srgbClr val="ED7D31"/>
+                          </a:solidFill>
+                        </a:rPr>
+                        <a:t> ● </a:t>
+                      </a:r>
+                      <a:r>
+                        <a:rPr lang="en-US" sz="1400" i="0" strike="noStrike" baseline="0" dirty="0">
+                          <a:solidFill>
+                            <a:srgbClr val="ED7D31"/>
+                          </a:solidFill>
+                        </a:rPr>
+                        <a:t> Bayes inference</a:t>
+                      </a:r>
+                      <a:r>
+                        <a:rPr lang="en-US" sz="1400" i="0" strike="noStrike" baseline="0" dirty="0"/>
+                        <a:t> </a:t>
+                      </a:r>
+                      <a:r>
+                        <a:rPr lang="en-US" sz="1400" i="0" strike="sngStrike" baseline="0" dirty="0">
+                          <a:solidFill>
+                            <a:srgbClr val="FFC000"/>
+                          </a:solidFill>
+                        </a:rPr>
+                        <a:t> ● </a:t>
+                      </a:r>
+                      <a:r>
+                        <a:rPr lang="en-US" sz="1400" i="0" strike="noStrike" baseline="0" dirty="0">
+                          <a:solidFill>
+                            <a:srgbClr val="FFC000"/>
+                          </a:solidFill>
+                        </a:rPr>
+                        <a:t> </a:t>
+                      </a:r>
+                      <a:r>
+                        <a:rPr lang="en-US" sz="1400" i="0" strike="noStrike" baseline="0" dirty="0" err="1">
+                          <a:solidFill>
+                            <a:srgbClr val="FFC000"/>
+                          </a:solidFill>
+                        </a:rPr>
+                        <a:t>SAXSMoW</a:t>
+                      </a:r>
+                      <a:r>
+                        <a:rPr lang="en-US" sz="1400" i="0" strike="noStrike" baseline="0" dirty="0"/>
+                        <a:t> </a:t>
+                      </a:r>
+                      <a:r>
+                        <a:rPr lang="en-US" sz="1400" i="0" strike="sngStrike" baseline="0" dirty="0"/>
+                        <a:t> ○ </a:t>
+                      </a:r>
+                      <a:r>
+                        <a:rPr lang="en-US" sz="1400" i="0" strike="noStrike" baseline="0" dirty="0"/>
+                        <a:t> Neural network</a:t>
+                      </a:r>
+                      <a:endParaRPr lang="LID4096" sz="1400" dirty="0"/>
                     </a:p>
                   </a:txBody>
                   <a:tcPr/>
@@ -10828,14 +10955,66 @@
                         <a:t>         </a:t>
                       </a:r>
                       <a:r>
-                        <a:rPr lang="en-US" i="1" dirty="0"/>
+                        <a:rPr lang="en-US" i="1" dirty="0" err="1"/>
                         <a:t>D</a:t>
                       </a:r>
                       <a:r>
-                        <a:rPr lang="en-US" i="1" baseline="-25000" dirty="0"/>
+                        <a:rPr lang="en-US" i="1" baseline="-25000" dirty="0" err="1"/>
                         <a:t>max</a:t>
                       </a:r>
-                      <a:endParaRPr lang="LID4096" i="1" baseline="-25000" dirty="0"/>
+                      <a:r>
+                        <a:rPr lang="en-US" i="1" baseline="-25000" dirty="0"/>
+                        <a:t>   </a:t>
+                      </a:r>
+                      <a:r>
+                        <a:rPr lang="en-US" sz="1600" i="0" strike="sngStrike" baseline="0" dirty="0">
+                          <a:solidFill>
+                            <a:srgbClr val="70AD47"/>
+                          </a:solidFill>
+                        </a:rPr>
+                        <a:t> ● </a:t>
+                      </a:r>
+                      <a:r>
+                        <a:rPr lang="en-US" sz="1600" i="0" strike="noStrike" baseline="0" dirty="0">
+                          <a:solidFill>
+                            <a:srgbClr val="70AD47"/>
+                          </a:solidFill>
+                        </a:rPr>
+                        <a:t> DATGNOM</a:t>
+                      </a:r>
+                      <a:r>
+                        <a:rPr lang="en-US" sz="1600" i="0" strike="noStrike" baseline="0" dirty="0"/>
+                        <a:t> </a:t>
+                      </a:r>
+                      <a:r>
+                        <a:rPr lang="en-US" sz="1600" i="0" strike="sngStrike" baseline="0" dirty="0">
+                          <a:solidFill>
+                            <a:srgbClr val="ED7D31"/>
+                          </a:solidFill>
+                        </a:rPr>
+                        <a:t> ● </a:t>
+                      </a:r>
+                      <a:r>
+                        <a:rPr lang="en-US" sz="1600" i="0" strike="noStrike" baseline="0" dirty="0">
+                          <a:solidFill>
+                            <a:srgbClr val="ED7D31"/>
+                          </a:solidFill>
+                        </a:rPr>
+                        <a:t> DATCLASS</a:t>
+                      </a:r>
+                      <a:r>
+                        <a:rPr lang="en-US" sz="1600" i="0" strike="noStrike" baseline="0" dirty="0"/>
+                        <a:t> </a:t>
+                      </a:r>
+                      <a:r>
+                        <a:rPr lang="en-US" sz="1600" i="0" strike="sngStrike" baseline="0" dirty="0"/>
+                        <a:t> ○ </a:t>
+                      </a:r>
+                      <a:r>
+                        <a:rPr lang="en-US" sz="1600" i="0" strike="noStrike" baseline="0" dirty="0"/>
+                        <a:t> Neural network</a:t>
+                      </a:r>
+                      <a:endParaRPr lang="LID4096" sz="1600" i="0" strike="noStrike" baseline="0" dirty="0"/>
                     </a:p>
                   </a:txBody>
                   <a:tcPr/>
@@ -10855,7 +11034,7 @@
                       <a:pPr algn="ctr"/>
                       <a:r>
                         <a:rPr lang="en-US" dirty="0"/>
-                        <a:t>Compact proteins</a:t>
+                        <a:t>Folded proteins</a:t>
                       </a:r>
                       <a:endParaRPr lang="LID4096" dirty="0"/>
                     </a:p>
@@ -10989,13 +11168,13 @@
           <p:nvPr>
             <p:extLst>
               <p:ext uri="{D42A27DB-BD31-4B8C-83A1-F6EECF244321}">
-                <p14:modId xmlns:p14="http://schemas.microsoft.com/office/powerpoint/2010/main" val="3545222923"/>
+                <p14:modId xmlns:p14="http://schemas.microsoft.com/office/powerpoint/2010/main" val="408621305"/>
               </p:ext>
             </p:extLst>
           </p:nvPr>
         </p:nvGraphicFramePr>
         <p:xfrm>
-          <a:off x="1560928" y="4636366"/>
+          <a:off x="1560928" y="4702951"/>
           <a:ext cx="4580071" cy="2147372"/>
         </p:xfrm>
         <a:graphic>
@@ -11017,13 +11196,13 @@
           <p:nvPr>
             <p:extLst>
               <p:ext uri="{D42A27DB-BD31-4B8C-83A1-F6EECF244321}">
-                <p14:modId xmlns:p14="http://schemas.microsoft.com/office/powerpoint/2010/main" val="3518936611"/>
+                <p14:modId xmlns:p14="http://schemas.microsoft.com/office/powerpoint/2010/main" val="2821052112"/>
               </p:ext>
             </p:extLst>
           </p:nvPr>
         </p:nvGraphicFramePr>
         <p:xfrm>
-          <a:off x="6881089" y="4627422"/>
+          <a:off x="6881089" y="4685129"/>
           <a:ext cx="4623092" cy="2178524"/>
         </p:xfrm>
         <a:graphic>
@@ -11032,65 +11211,6 @@
           </a:graphicData>
         </a:graphic>
       </p:graphicFrame>
-      <p:pic>
-        <p:nvPicPr>
-          <p:cNvPr id="10" name="Picture 9">
-            <a:extLst>
-              <a:ext uri="{FF2B5EF4-FFF2-40B4-BE49-F238E27FC236}">
-                <a16:creationId xmlns:a16="http://schemas.microsoft.com/office/drawing/2014/main" id="{65714F65-FC5D-4B03-84D8-CD374B3F5539}"/>
-              </a:ext>
-            </a:extLst>
-          </p:cNvPr>
-          <p:cNvPicPr>
-            <a:picLocks noChangeAspect="1"/>
-          </p:cNvPicPr>
-          <p:nvPr/>
-        </p:nvPicPr>
-        <p:blipFill>
-          <a:blip r:embed="rId4"/>
-          <a:stretch>
-            <a:fillRect/>
-          </a:stretch>
-        </p:blipFill>
-        <p:spPr>
-          <a:xfrm>
-            <a:off x="7555525" y="249773"/>
-            <a:ext cx="3629532" cy="295316"/>
-          </a:xfrm>
-          <a:prstGeom prst="rect">
-            <a:avLst/>
-          </a:prstGeom>
-        </p:spPr>
-      </p:pic>
-      <p:pic>
-        <p:nvPicPr>
-          <p:cNvPr id="11" name="Picture 10">
-            <a:extLst>
-              <a:ext uri="{FF2B5EF4-FFF2-40B4-BE49-F238E27FC236}">
-                <a16:creationId xmlns:a16="http://schemas.microsoft.com/office/drawing/2014/main" id="{68F96CDD-49D4-4EB6-AFE8-445E21B21A9F}"/>
-              </a:ext>
-            </a:extLst>
-          </p:cNvPr>
-          <p:cNvPicPr>
-            <a:picLocks noChangeAspect="1"/>
-          </p:cNvPicPr>
-          <p:nvPr/>
-        </p:nvPicPr>
-        <p:blipFill rotWithShape="1">
-          <a:blip r:embed="rId5"/>
-          <a:srcRect t="16128" b="14254"/>
-          <a:stretch/>
-        </p:blipFill>
-        <p:spPr>
-          <a:xfrm>
-            <a:off x="1917977" y="194605"/>
-            <a:ext cx="4178024" cy="413133"/>
-          </a:xfrm>
-          <a:prstGeom prst="rect">
-            <a:avLst/>
-          </a:prstGeom>
-        </p:spPr>
-      </p:pic>
       <p:graphicFrame>
         <p:nvGraphicFramePr>
           <p:cNvPr id="25" name="Chart 24">
@@ -11106,18 +11226,18 @@
           <p:nvPr>
             <p:extLst>
               <p:ext uri="{D42A27DB-BD31-4B8C-83A1-F6EECF244321}">
-                <p14:modId xmlns:p14="http://schemas.microsoft.com/office/powerpoint/2010/main" val="3593449338"/>
+                <p14:modId xmlns:p14="http://schemas.microsoft.com/office/powerpoint/2010/main" val="257828932"/>
               </p:ext>
             </p:extLst>
           </p:nvPr>
         </p:nvGraphicFramePr>
         <p:xfrm>
-          <a:off x="1552155" y="637032"/>
+          <a:off x="1552155" y="681422"/>
           <a:ext cx="4580071" cy="2147372"/>
         </p:xfrm>
         <a:graphic>
           <a:graphicData uri="http://schemas.openxmlformats.org/drawingml/2006/chart">
-            <c:chart xmlns:c="http://schemas.openxmlformats.org/drawingml/2006/chart" xmlns:r="http://schemas.openxmlformats.org/officeDocument/2006/relationships" r:id="rId6"/>
+            <c:chart xmlns:c="http://schemas.openxmlformats.org/drawingml/2006/chart" xmlns:r="http://schemas.openxmlformats.org/officeDocument/2006/relationships" r:id="rId4"/>
           </a:graphicData>
         </a:graphic>
       </p:graphicFrame>
@@ -11136,18 +11256,18 @@
           <p:nvPr>
             <p:extLst>
               <p:ext uri="{D42A27DB-BD31-4B8C-83A1-F6EECF244321}">
-                <p14:modId xmlns:p14="http://schemas.microsoft.com/office/powerpoint/2010/main" val="3554179591"/>
+                <p14:modId xmlns:p14="http://schemas.microsoft.com/office/powerpoint/2010/main" val="391696770"/>
               </p:ext>
             </p:extLst>
           </p:nvPr>
         </p:nvGraphicFramePr>
         <p:xfrm>
-          <a:off x="6886299" y="655494"/>
+          <a:off x="6886299" y="699884"/>
           <a:ext cx="4623092" cy="2147372"/>
         </p:xfrm>
         <a:graphic>
           <a:graphicData uri="http://schemas.openxmlformats.org/drawingml/2006/chart">
-            <c:chart xmlns:c="http://schemas.openxmlformats.org/drawingml/2006/chart" xmlns:r="http://schemas.openxmlformats.org/officeDocument/2006/relationships" r:id="rId7"/>
+            <c:chart xmlns:c="http://schemas.openxmlformats.org/drawingml/2006/chart" xmlns:r="http://schemas.openxmlformats.org/officeDocument/2006/relationships" r:id="rId5"/>
           </a:graphicData>
         </a:graphic>
       </p:graphicFrame>
@@ -11166,18 +11286,18 @@
           <p:nvPr>
             <p:extLst>
               <p:ext uri="{D42A27DB-BD31-4B8C-83A1-F6EECF244321}">
-                <p14:modId xmlns:p14="http://schemas.microsoft.com/office/powerpoint/2010/main" val="3127543181"/>
+                <p14:modId xmlns:p14="http://schemas.microsoft.com/office/powerpoint/2010/main" val="450773995"/>
               </p:ext>
             </p:extLst>
           </p:nvPr>
         </p:nvGraphicFramePr>
         <p:xfrm>
-          <a:off x="1561390" y="2619889"/>
+          <a:off x="1561390" y="2699791"/>
           <a:ext cx="4579609" cy="2147372"/>
         </p:xfrm>
         <a:graphic>
           <a:graphicData uri="http://schemas.openxmlformats.org/drawingml/2006/chart">
-            <c:chart xmlns:c="http://schemas.openxmlformats.org/drawingml/2006/chart" xmlns:r="http://schemas.openxmlformats.org/officeDocument/2006/relationships" r:id="rId8"/>
+            <c:chart xmlns:c="http://schemas.openxmlformats.org/drawingml/2006/chart" xmlns:r="http://schemas.openxmlformats.org/officeDocument/2006/relationships" r:id="rId6"/>
           </a:graphicData>
         </a:graphic>
       </p:graphicFrame>
@@ -11196,21 +11316,171 @@
           <p:nvPr>
             <p:extLst>
               <p:ext uri="{D42A27DB-BD31-4B8C-83A1-F6EECF244321}">
-                <p14:modId xmlns:p14="http://schemas.microsoft.com/office/powerpoint/2010/main" val="1259027227"/>
+                <p14:modId xmlns:p14="http://schemas.microsoft.com/office/powerpoint/2010/main" val="676096952"/>
               </p:ext>
             </p:extLst>
           </p:nvPr>
         </p:nvGraphicFramePr>
         <p:xfrm>
-          <a:off x="6826752" y="2659789"/>
+          <a:off x="6826752" y="2721935"/>
           <a:ext cx="4677429" cy="2128910"/>
         </p:xfrm>
         <a:graphic>
           <a:graphicData uri="http://schemas.openxmlformats.org/drawingml/2006/chart">
-            <c:chart xmlns:c="http://schemas.openxmlformats.org/drawingml/2006/chart" xmlns:r="http://schemas.openxmlformats.org/officeDocument/2006/relationships" r:id="rId9"/>
+            <c:chart xmlns:c="http://schemas.openxmlformats.org/drawingml/2006/chart" xmlns:r="http://schemas.openxmlformats.org/officeDocument/2006/relationships" r:id="rId7"/>
           </a:graphicData>
         </a:graphic>
       </p:graphicFrame>
+      <p:sp>
+        <p:nvSpPr>
+          <p:cNvPr id="2" name="TextBox 1">
+            <a:extLst>
+              <a:ext uri="{FF2B5EF4-FFF2-40B4-BE49-F238E27FC236}">
+                <a16:creationId xmlns:a16="http://schemas.microsoft.com/office/drawing/2014/main" id="{00413AFB-249B-408D-856F-89FE08F2E7DC}"/>
+              </a:ext>
+            </a:extLst>
+          </p:cNvPr>
+          <p:cNvSpPr txBox="1"/>
+          <p:nvPr/>
+        </p:nvSpPr>
+        <p:spPr>
+          <a:xfrm>
+            <a:off x="11327906" y="2564058"/>
+            <a:ext cx="529312" cy="246221"/>
+          </a:xfrm>
+          <a:prstGeom prst="rect">
+            <a:avLst/>
+          </a:prstGeom>
+          <a:noFill/>
+        </p:spPr>
+        <p:txBody>
+          <a:bodyPr wrap="none" rtlCol="0">
+            <a:spAutoFit/>
+          </a:bodyPr>
+          <a:lstStyle/>
+          <a:p>
+            <a:r>
+              <a:rPr lang="en-US" sz="1000" dirty="0">
+                <a:solidFill>
+                  <a:schemeClr val="tx1">
+                    <a:lumMod val="65000"/>
+                    <a:lumOff val="35000"/>
+                  </a:schemeClr>
+                </a:solidFill>
+              </a:rPr>
+              <a:t>mg/ml</a:t>
+            </a:r>
+            <a:endParaRPr lang="en-DE" sz="1000" dirty="0">
+              <a:solidFill>
+                <a:schemeClr val="tx1">
+                  <a:lumMod val="65000"/>
+                  <a:lumOff val="35000"/>
+                </a:schemeClr>
+              </a:solidFill>
+            </a:endParaRPr>
+          </a:p>
+        </p:txBody>
+      </p:sp>
+      <p:sp>
+        <p:nvSpPr>
+          <p:cNvPr id="12" name="TextBox 11">
+            <a:extLst>
+              <a:ext uri="{FF2B5EF4-FFF2-40B4-BE49-F238E27FC236}">
+                <a16:creationId xmlns:a16="http://schemas.microsoft.com/office/drawing/2014/main" id="{AE0BB484-5635-4466-8CB4-F35850013DE4}"/>
+              </a:ext>
+            </a:extLst>
+          </p:cNvPr>
+          <p:cNvSpPr txBox="1"/>
+          <p:nvPr/>
+        </p:nvSpPr>
+        <p:spPr>
+          <a:xfrm>
+            <a:off x="11327906" y="4570630"/>
+            <a:ext cx="529312" cy="246221"/>
+          </a:xfrm>
+          <a:prstGeom prst="rect">
+            <a:avLst/>
+          </a:prstGeom>
+          <a:noFill/>
+        </p:spPr>
+        <p:txBody>
+          <a:bodyPr wrap="none" rtlCol="0">
+            <a:spAutoFit/>
+          </a:bodyPr>
+          <a:lstStyle/>
+          <a:p>
+            <a:r>
+              <a:rPr lang="en-US" sz="1000" dirty="0">
+                <a:solidFill>
+                  <a:schemeClr val="tx1">
+                    <a:lumMod val="65000"/>
+                    <a:lumOff val="35000"/>
+                  </a:schemeClr>
+                </a:solidFill>
+              </a:rPr>
+              <a:t>mg/ml</a:t>
+            </a:r>
+            <a:endParaRPr lang="en-DE" sz="1000" dirty="0">
+              <a:solidFill>
+                <a:schemeClr val="tx1">
+                  <a:lumMod val="65000"/>
+                  <a:lumOff val="35000"/>
+                </a:schemeClr>
+              </a:solidFill>
+            </a:endParaRPr>
+          </a:p>
+        </p:txBody>
+      </p:sp>
+      <p:sp>
+        <p:nvSpPr>
+          <p:cNvPr id="13" name="TextBox 12">
+            <a:extLst>
+              <a:ext uri="{FF2B5EF4-FFF2-40B4-BE49-F238E27FC236}">
+                <a16:creationId xmlns:a16="http://schemas.microsoft.com/office/drawing/2014/main" id="{B3D66100-E0AE-4082-8B03-A3CBF1DD03DF}"/>
+              </a:ext>
+            </a:extLst>
+          </p:cNvPr>
+          <p:cNvSpPr txBox="1"/>
+          <p:nvPr/>
+        </p:nvSpPr>
+        <p:spPr>
+          <a:xfrm>
+            <a:off x="11327906" y="6575093"/>
+            <a:ext cx="529312" cy="246221"/>
+          </a:xfrm>
+          <a:prstGeom prst="rect">
+            <a:avLst/>
+          </a:prstGeom>
+          <a:noFill/>
+        </p:spPr>
+        <p:txBody>
+          <a:bodyPr wrap="none" rtlCol="0">
+            <a:spAutoFit/>
+          </a:bodyPr>
+          <a:lstStyle/>
+          <a:p>
+            <a:r>
+              <a:rPr lang="en-US" sz="1000" dirty="0">
+                <a:solidFill>
+                  <a:schemeClr val="tx1">
+                    <a:lumMod val="65000"/>
+                    <a:lumOff val="35000"/>
+                  </a:schemeClr>
+                </a:solidFill>
+              </a:rPr>
+              <a:t>mg/ml</a:t>
+            </a:r>
+            <a:endParaRPr lang="en-DE" sz="1000" dirty="0">
+              <a:solidFill>
+                <a:schemeClr val="tx1">
+                  <a:lumMod val="65000"/>
+                  <a:lumOff val="35000"/>
+                </a:schemeClr>
+              </a:solidFill>
+            </a:endParaRPr>
+          </a:p>
+        </p:txBody>
+      </p:sp>
     </p:spTree>
     <p:extLst>
       <p:ext uri="{BB962C8B-B14F-4D97-AF65-F5344CB8AC3E}">

</xml_diff>